<commit_message>
pridane veci z 1 reportu okrem ext, literatura fixed, prezentacia typo fixed
</commit_message>
<xml_diff>
--- a/docs/progress-reports/1/ProgressReport1-Cederle-Marek.pptx
+++ b/docs/progress-reports/1/ProgressReport1-Cederle-Marek.pptx
@@ -213,7 +213,7 @@
           <a:p>
             <a:fld id="{DC78FC95-7687-4936-B356-C99472816EC6}" type="datetimeFigureOut">
               <a:rPr lang="sk-SK" smtClean="0"/>
-              <a:t>14. 3. 2024</a:t>
+              <a:t>27. 4. 2024</a:t>
             </a:fld>
             <a:endParaRPr lang="sk-SK"/>
           </a:p>
@@ -2357,7 +2357,7 @@
           <a:p>
             <a:fld id="{9BADB805-EF45-4459-B069-FB73EDBF81D3}" type="datetimeFigureOut">
               <a:rPr lang="sk-SK" smtClean="0"/>
-              <a:t>14. 3. 2024</a:t>
+              <a:t>27. 4. 2024</a:t>
             </a:fld>
             <a:endParaRPr lang="sk-SK"/>
           </a:p>
@@ -2555,7 +2555,7 @@
           <a:p>
             <a:fld id="{9BADB805-EF45-4459-B069-FB73EDBF81D3}" type="datetimeFigureOut">
               <a:rPr lang="sk-SK" smtClean="0"/>
-              <a:t>14. 3. 2024</a:t>
+              <a:t>27. 4. 2024</a:t>
             </a:fld>
             <a:endParaRPr lang="sk-SK"/>
           </a:p>
@@ -2763,7 +2763,7 @@
           <a:p>
             <a:fld id="{9BADB805-EF45-4459-B069-FB73EDBF81D3}" type="datetimeFigureOut">
               <a:rPr lang="sk-SK" smtClean="0"/>
-              <a:t>14. 3. 2024</a:t>
+              <a:t>27. 4. 2024</a:t>
             </a:fld>
             <a:endParaRPr lang="sk-SK"/>
           </a:p>
@@ -2961,7 +2961,7 @@
           <a:p>
             <a:fld id="{9BADB805-EF45-4459-B069-FB73EDBF81D3}" type="datetimeFigureOut">
               <a:rPr lang="sk-SK" smtClean="0"/>
-              <a:t>14. 3. 2024</a:t>
+              <a:t>27. 4. 2024</a:t>
             </a:fld>
             <a:endParaRPr lang="sk-SK"/>
           </a:p>
@@ -3236,7 +3236,7 @@
           <a:p>
             <a:fld id="{9BADB805-EF45-4459-B069-FB73EDBF81D3}" type="datetimeFigureOut">
               <a:rPr lang="sk-SK" smtClean="0"/>
-              <a:t>14. 3. 2024</a:t>
+              <a:t>27. 4. 2024</a:t>
             </a:fld>
             <a:endParaRPr lang="sk-SK"/>
           </a:p>
@@ -3501,7 +3501,7 @@
           <a:p>
             <a:fld id="{9BADB805-EF45-4459-B069-FB73EDBF81D3}" type="datetimeFigureOut">
               <a:rPr lang="sk-SK" smtClean="0"/>
-              <a:t>14. 3. 2024</a:t>
+              <a:t>27. 4. 2024</a:t>
             </a:fld>
             <a:endParaRPr lang="sk-SK"/>
           </a:p>
@@ -3913,7 +3913,7 @@
           <a:p>
             <a:fld id="{9BADB805-EF45-4459-B069-FB73EDBF81D3}" type="datetimeFigureOut">
               <a:rPr lang="sk-SK" smtClean="0"/>
-              <a:t>14. 3. 2024</a:t>
+              <a:t>27. 4. 2024</a:t>
             </a:fld>
             <a:endParaRPr lang="sk-SK"/>
           </a:p>
@@ -4054,7 +4054,7 @@
           <a:p>
             <a:fld id="{9BADB805-EF45-4459-B069-FB73EDBF81D3}" type="datetimeFigureOut">
               <a:rPr lang="sk-SK" smtClean="0"/>
-              <a:t>14. 3. 2024</a:t>
+              <a:t>27. 4. 2024</a:t>
             </a:fld>
             <a:endParaRPr lang="sk-SK"/>
           </a:p>
@@ -4167,7 +4167,7 @@
           <a:p>
             <a:fld id="{9BADB805-EF45-4459-B069-FB73EDBF81D3}" type="datetimeFigureOut">
               <a:rPr lang="sk-SK" smtClean="0"/>
-              <a:t>14. 3. 2024</a:t>
+              <a:t>27. 4. 2024</a:t>
             </a:fld>
             <a:endParaRPr lang="sk-SK"/>
           </a:p>
@@ -4478,7 +4478,7 @@
           <a:p>
             <a:fld id="{9BADB805-EF45-4459-B069-FB73EDBF81D3}" type="datetimeFigureOut">
               <a:rPr lang="sk-SK" smtClean="0"/>
-              <a:t>14. 3. 2024</a:t>
+              <a:t>27. 4. 2024</a:t>
             </a:fld>
             <a:endParaRPr lang="sk-SK"/>
           </a:p>
@@ -4766,7 +4766,7 @@
           <a:p>
             <a:fld id="{9BADB805-EF45-4459-B069-FB73EDBF81D3}" type="datetimeFigureOut">
               <a:rPr lang="sk-SK" smtClean="0"/>
-              <a:t>14. 3. 2024</a:t>
+              <a:t>27. 4. 2024</a:t>
             </a:fld>
             <a:endParaRPr lang="sk-SK"/>
           </a:p>
@@ -5007,7 +5007,7 @@
           <a:p>
             <a:fld id="{9BADB805-EF45-4459-B069-FB73EDBF81D3}" type="datetimeFigureOut">
               <a:rPr lang="sk-SK" smtClean="0"/>
-              <a:t>14. 3. 2024</a:t>
+              <a:t>27. 4. 2024</a:t>
             </a:fld>
             <a:endParaRPr lang="sk-SK"/>
           </a:p>
@@ -7210,15 +7210,7 @@
           <a:p>
             <a:r>
               <a:rPr lang="sk-SK" dirty="0"/>
-              <a:t>Pre operačný </a:t>
-            </a:r>
-            <a:r>
-              <a:rPr lang="sk-SK" dirty="0" err="1"/>
-              <a:t>sytsém</a:t>
-            </a:r>
-            <a:r>
-              <a:rPr lang="sk-SK" dirty="0"/>
-              <a:t> Windows</a:t>
+              <a:t>Pre operačný systém Windows</a:t>
             </a:r>
           </a:p>
           <a:p>

</xml_diff>